<commit_message>
Update or Add new ppts
</commit_message>
<xml_diff>
--- a/2019/6月.pptx
+++ b/2019/6月.pptx
@@ -12,7 +12,7 @@
     <p:sldId id="261" r:id="rId6"/>
     <p:sldId id="262" r:id="rId7"/>
   </p:sldIdLst>
-  <p:sldSz cx="9144000" cy="6858000" type="screen4x3"/>
+  <p:sldSz cx="9144000" cy="5143500" type="screen16x9"/>
   <p:notesSz cx="6858000" cy="9144000"/>
   <p:defaultTextStyle>
     <a:defPPr>
@@ -141,8 +141,8 @@
         </p:nvSpPr>
         <p:spPr>
           <a:xfrm>
-            <a:off x="685800" y="2130425"/>
-            <a:ext cx="7772400" cy="1470025"/>
+            <a:off x="685800" y="1597819"/>
+            <a:ext cx="7772400" cy="1102519"/>
           </a:xfrm>
         </p:spPr>
         <p:txBody>
@@ -169,8 +169,8 @@
         </p:nvSpPr>
         <p:spPr>
           <a:xfrm>
-            <a:off x="1371600" y="3886200"/>
-            <a:ext cx="6400800" cy="1752600"/>
+            <a:off x="1371600" y="2914650"/>
+            <a:ext cx="6400800" cy="1314450"/>
           </a:xfrm>
         </p:spPr>
         <p:txBody>
@@ -294,7 +294,7 @@
             <a:fld id="{A1DD3794-341D-400B-AD73-694E68B4FCFE}" type="datetimeFigureOut">
               <a:rPr lang="zh-TW" altLang="en-US" smtClean="0"/>
               <a:pPr/>
-              <a:t>2019/6/9</a:t>
+              <a:t>2019/7/6</a:t>
             </a:fld>
             <a:endParaRPr lang="zh-TW" altLang="en-US"/>
           </a:p>
@@ -461,7 +461,7 @@
             <a:fld id="{A1DD3794-341D-400B-AD73-694E68B4FCFE}" type="datetimeFigureOut">
               <a:rPr lang="zh-TW" altLang="en-US" smtClean="0"/>
               <a:pPr/>
-              <a:t>2019/6/9</a:t>
+              <a:t>2019/7/6</a:t>
             </a:fld>
             <a:endParaRPr lang="zh-TW" altLang="en-US"/>
           </a:p>
@@ -547,8 +547,8 @@
         </p:nvSpPr>
         <p:spPr>
           <a:xfrm>
-            <a:off x="6629400" y="274638"/>
-            <a:ext cx="2057400" cy="5851525"/>
+            <a:off x="6629400" y="205979"/>
+            <a:ext cx="2057400" cy="4388644"/>
           </a:xfrm>
         </p:spPr>
         <p:txBody>
@@ -575,8 +575,8 @@
         </p:nvSpPr>
         <p:spPr>
           <a:xfrm>
-            <a:off x="457200" y="274638"/>
-            <a:ext cx="6019800" cy="5851525"/>
+            <a:off x="457200" y="205979"/>
+            <a:ext cx="6019800" cy="4388644"/>
           </a:xfrm>
         </p:spPr>
         <p:txBody>
@@ -638,7 +638,7 @@
             <a:fld id="{A1DD3794-341D-400B-AD73-694E68B4FCFE}" type="datetimeFigureOut">
               <a:rPr lang="zh-TW" altLang="en-US" smtClean="0"/>
               <a:pPr/>
-              <a:t>2019/6/9</a:t>
+              <a:t>2019/7/6</a:t>
             </a:fld>
             <a:endParaRPr lang="zh-TW" altLang="en-US"/>
           </a:p>
@@ -805,7 +805,7 @@
             <a:fld id="{A1DD3794-341D-400B-AD73-694E68B4FCFE}" type="datetimeFigureOut">
               <a:rPr lang="zh-TW" altLang="en-US" smtClean="0"/>
               <a:pPr/>
-              <a:t>2019/6/9</a:t>
+              <a:t>2019/7/6</a:t>
             </a:fld>
             <a:endParaRPr lang="zh-TW" altLang="en-US"/>
           </a:p>
@@ -891,8 +891,8 @@
         </p:nvSpPr>
         <p:spPr>
           <a:xfrm>
-            <a:off x="722313" y="4406900"/>
-            <a:ext cx="7772400" cy="1362075"/>
+            <a:off x="722313" y="3305176"/>
+            <a:ext cx="7772400" cy="1021556"/>
           </a:xfrm>
         </p:spPr>
         <p:txBody>
@@ -923,8 +923,8 @@
         </p:nvSpPr>
         <p:spPr>
           <a:xfrm>
-            <a:off x="722313" y="2906713"/>
-            <a:ext cx="7772400" cy="1500187"/>
+            <a:off x="722313" y="2180035"/>
+            <a:ext cx="7772400" cy="1125140"/>
           </a:xfrm>
         </p:spPr>
         <p:txBody>
@@ -1048,7 +1048,7 @@
             <a:fld id="{A1DD3794-341D-400B-AD73-694E68B4FCFE}" type="datetimeFigureOut">
               <a:rPr lang="zh-TW" altLang="en-US" smtClean="0"/>
               <a:pPr/>
-              <a:t>2019/6/9</a:t>
+              <a:t>2019/7/6</a:t>
             </a:fld>
             <a:endParaRPr lang="zh-TW" altLang="en-US"/>
           </a:p>
@@ -1157,8 +1157,8 @@
         </p:nvSpPr>
         <p:spPr>
           <a:xfrm>
-            <a:off x="457200" y="1600200"/>
-            <a:ext cx="4038600" cy="4525963"/>
+            <a:off x="457200" y="1200151"/>
+            <a:ext cx="4038600" cy="3394472"/>
           </a:xfrm>
         </p:spPr>
         <p:txBody>
@@ -1242,8 +1242,8 @@
         </p:nvSpPr>
         <p:spPr>
           <a:xfrm>
-            <a:off x="4648200" y="1600200"/>
-            <a:ext cx="4038600" cy="4525963"/>
+            <a:off x="4648200" y="1200151"/>
+            <a:ext cx="4038600" cy="3394472"/>
           </a:xfrm>
         </p:spPr>
         <p:txBody>
@@ -1333,7 +1333,7 @@
             <a:fld id="{A1DD3794-341D-400B-AD73-694E68B4FCFE}" type="datetimeFigureOut">
               <a:rPr lang="zh-TW" altLang="en-US" smtClean="0"/>
               <a:pPr/>
-              <a:t>2019/6/9</a:t>
+              <a:t>2019/7/6</a:t>
             </a:fld>
             <a:endParaRPr lang="zh-TW" altLang="en-US"/>
           </a:p>
@@ -1446,8 +1446,8 @@
         </p:nvSpPr>
         <p:spPr>
           <a:xfrm>
-            <a:off x="457200" y="1535113"/>
-            <a:ext cx="4040188" cy="639762"/>
+            <a:off x="457200" y="1151335"/>
+            <a:ext cx="4040188" cy="479822"/>
           </a:xfrm>
         </p:spPr>
         <p:txBody>
@@ -1511,8 +1511,8 @@
         </p:nvSpPr>
         <p:spPr>
           <a:xfrm>
-            <a:off x="457200" y="2174875"/>
-            <a:ext cx="4040188" cy="3951288"/>
+            <a:off x="457200" y="1631156"/>
+            <a:ext cx="4040188" cy="2963466"/>
           </a:xfrm>
         </p:spPr>
         <p:txBody>
@@ -1596,8 +1596,8 @@
         </p:nvSpPr>
         <p:spPr>
           <a:xfrm>
-            <a:off x="4645025" y="1535113"/>
-            <a:ext cx="4041775" cy="639762"/>
+            <a:off x="4645026" y="1151335"/>
+            <a:ext cx="4041775" cy="479822"/>
           </a:xfrm>
         </p:spPr>
         <p:txBody>
@@ -1661,8 +1661,8 @@
         </p:nvSpPr>
         <p:spPr>
           <a:xfrm>
-            <a:off x="4645025" y="2174875"/>
-            <a:ext cx="4041775" cy="3951288"/>
+            <a:off x="4645026" y="1631156"/>
+            <a:ext cx="4041775" cy="2963466"/>
           </a:xfrm>
         </p:spPr>
         <p:txBody>
@@ -1752,7 +1752,7 @@
             <a:fld id="{A1DD3794-341D-400B-AD73-694E68B4FCFE}" type="datetimeFigureOut">
               <a:rPr lang="zh-TW" altLang="en-US" smtClean="0"/>
               <a:pPr/>
-              <a:t>2019/6/9</a:t>
+              <a:t>2019/7/6</a:t>
             </a:fld>
             <a:endParaRPr lang="zh-TW" altLang="en-US"/>
           </a:p>
@@ -1867,7 +1867,7 @@
             <a:fld id="{A1DD3794-341D-400B-AD73-694E68B4FCFE}" type="datetimeFigureOut">
               <a:rPr lang="zh-TW" altLang="en-US" smtClean="0"/>
               <a:pPr/>
-              <a:t>2019/6/9</a:t>
+              <a:t>2019/7/6</a:t>
             </a:fld>
             <a:endParaRPr lang="zh-TW" altLang="en-US"/>
           </a:p>
@@ -1959,7 +1959,7 @@
             <a:fld id="{A1DD3794-341D-400B-AD73-694E68B4FCFE}" type="datetimeFigureOut">
               <a:rPr lang="zh-TW" altLang="en-US" smtClean="0"/>
               <a:pPr/>
-              <a:t>2019/6/9</a:t>
+              <a:t>2019/7/6</a:t>
             </a:fld>
             <a:endParaRPr lang="zh-TW" altLang="en-US"/>
           </a:p>
@@ -2045,8 +2045,8 @@
         </p:nvSpPr>
         <p:spPr>
           <a:xfrm>
-            <a:off x="457200" y="273050"/>
-            <a:ext cx="3008313" cy="1162050"/>
+            <a:off x="457201" y="204787"/>
+            <a:ext cx="3008313" cy="871538"/>
           </a:xfrm>
         </p:spPr>
         <p:txBody>
@@ -2077,8 +2077,8 @@
         </p:nvSpPr>
         <p:spPr>
           <a:xfrm>
-            <a:off x="3575050" y="273050"/>
-            <a:ext cx="5111750" cy="5853113"/>
+            <a:off x="3575050" y="204788"/>
+            <a:ext cx="5111750" cy="4389835"/>
           </a:xfrm>
         </p:spPr>
         <p:txBody>
@@ -2162,8 +2162,8 @@
         </p:nvSpPr>
         <p:spPr>
           <a:xfrm>
-            <a:off x="457200" y="1435100"/>
-            <a:ext cx="3008313" cy="4691063"/>
+            <a:off x="457201" y="1076326"/>
+            <a:ext cx="3008313" cy="3518297"/>
           </a:xfrm>
         </p:spPr>
         <p:txBody>
@@ -2233,7 +2233,7 @@
             <a:fld id="{A1DD3794-341D-400B-AD73-694E68B4FCFE}" type="datetimeFigureOut">
               <a:rPr lang="zh-TW" altLang="en-US" smtClean="0"/>
               <a:pPr/>
-              <a:t>2019/6/9</a:t>
+              <a:t>2019/7/6</a:t>
             </a:fld>
             <a:endParaRPr lang="zh-TW" altLang="en-US"/>
           </a:p>
@@ -2319,8 +2319,8 @@
         </p:nvSpPr>
         <p:spPr>
           <a:xfrm>
-            <a:off x="1792288" y="4800600"/>
-            <a:ext cx="5486400" cy="566738"/>
+            <a:off x="1792288" y="3600450"/>
+            <a:ext cx="5486400" cy="425054"/>
           </a:xfrm>
         </p:spPr>
         <p:txBody>
@@ -2351,8 +2351,8 @@
         </p:nvSpPr>
         <p:spPr>
           <a:xfrm>
-            <a:off x="1792288" y="612775"/>
-            <a:ext cx="5486400" cy="4114800"/>
+            <a:off x="1792288" y="459581"/>
+            <a:ext cx="5486400" cy="3086100"/>
           </a:xfrm>
         </p:spPr>
         <p:txBody>
@@ -2416,8 +2416,8 @@
         </p:nvSpPr>
         <p:spPr>
           <a:xfrm>
-            <a:off x="1792288" y="5367338"/>
-            <a:ext cx="5486400" cy="804862"/>
+            <a:off x="1792288" y="4025503"/>
+            <a:ext cx="5486400" cy="603647"/>
           </a:xfrm>
         </p:spPr>
         <p:txBody>
@@ -2487,7 +2487,7 @@
             <a:fld id="{A1DD3794-341D-400B-AD73-694E68B4FCFE}" type="datetimeFigureOut">
               <a:rPr lang="zh-TW" altLang="en-US" smtClean="0"/>
               <a:pPr/>
-              <a:t>2019/6/9</a:t>
+              <a:t>2019/7/6</a:t>
             </a:fld>
             <a:endParaRPr lang="zh-TW" altLang="en-US"/>
           </a:p>
@@ -2583,8 +2583,8 @@
         </p:nvSpPr>
         <p:spPr>
           <a:xfrm>
-            <a:off x="457200" y="274638"/>
-            <a:ext cx="8229600" cy="1143000"/>
+            <a:off x="457200" y="205979"/>
+            <a:ext cx="8229600" cy="857250"/>
           </a:xfrm>
           <a:prstGeom prst="rect">
             <a:avLst/>
@@ -2616,8 +2616,8 @@
         </p:nvSpPr>
         <p:spPr>
           <a:xfrm>
-            <a:off x="457200" y="1600200"/>
-            <a:ext cx="8229600" cy="4525963"/>
+            <a:off x="457200" y="1200151"/>
+            <a:ext cx="8229600" cy="3394472"/>
           </a:xfrm>
           <a:prstGeom prst="rect">
             <a:avLst/>
@@ -2678,8 +2678,8 @@
         </p:nvSpPr>
         <p:spPr>
           <a:xfrm>
-            <a:off x="457200" y="6356350"/>
-            <a:ext cx="2133600" cy="365125"/>
+            <a:off x="457200" y="4767263"/>
+            <a:ext cx="2133600" cy="273844"/>
           </a:xfrm>
           <a:prstGeom prst="rect">
             <a:avLst/>
@@ -2702,7 +2702,7 @@
             <a:fld id="{A1DD3794-341D-400B-AD73-694E68B4FCFE}" type="datetimeFigureOut">
               <a:rPr lang="zh-TW" altLang="en-US" smtClean="0"/>
               <a:pPr/>
-              <a:t>2019/6/9</a:t>
+              <a:t>2019/7/6</a:t>
             </a:fld>
             <a:endParaRPr lang="zh-TW" altLang="en-US"/>
           </a:p>
@@ -2720,8 +2720,8 @@
         </p:nvSpPr>
         <p:spPr>
           <a:xfrm>
-            <a:off x="3124200" y="6356350"/>
-            <a:ext cx="2895600" cy="365125"/>
+            <a:off x="3124200" y="4767263"/>
+            <a:ext cx="2895600" cy="273844"/>
           </a:xfrm>
           <a:prstGeom prst="rect">
             <a:avLst/>
@@ -2757,8 +2757,8 @@
         </p:nvSpPr>
         <p:spPr>
           <a:xfrm>
-            <a:off x="6553200" y="6356350"/>
-            <a:ext cx="2133600" cy="365125"/>
+            <a:off x="6553200" y="4767263"/>
+            <a:ext cx="2133600" cy="273844"/>
           </a:xfrm>
           <a:prstGeom prst="rect">
             <a:avLst/>
@@ -3091,7 +3091,7 @@
           <a:lstStyle/>
           <a:p>
             <a:r>
-              <a:rPr lang="zh-TW" altLang="en-US" b="1" dirty="0">
+              <a:rPr lang="zh-TW" altLang="en-US" sz="4000" b="1" dirty="0">
                 <a:solidFill>
                   <a:srgbClr val="000066"/>
                 </a:solidFill>
@@ -3101,7 +3101,7 @@
               <a:t>讚美之</a:t>
             </a:r>
             <a:r>
-              <a:rPr lang="zh-TW" altLang="en-US" b="1" dirty="0" smtClean="0">
+              <a:rPr lang="zh-TW" altLang="en-US" sz="4000" b="1" dirty="0" smtClean="0">
                 <a:solidFill>
                   <a:srgbClr val="000066"/>
                 </a:solidFill>
@@ -3110,7 +3110,7 @@
               </a:rPr>
               <a:t>泉</a:t>
             </a:r>
-            <a:endParaRPr lang="zh-TW" altLang="en-US" b="1" dirty="0">
+            <a:endParaRPr lang="zh-TW" altLang="en-US" sz="4000" b="1" dirty="0">
               <a:solidFill>
                 <a:srgbClr val="000066"/>
               </a:solidFill>
@@ -3133,7 +3133,7 @@
         <p:spPr/>
         <p:txBody>
           <a:bodyPr>
-            <a:normAutofit/>
+            <a:noAutofit/>
           </a:bodyPr>
           <a:lstStyle/>
           <a:p>
@@ -3141,7 +3141,7 @@
               <a:buNone/>
             </a:pPr>
             <a:r>
-              <a:rPr lang="zh-TW" altLang="en-US" sz="5400" b="1" dirty="0">
+              <a:rPr lang="zh-TW" altLang="en-US" sz="4400" b="1" dirty="0">
                 <a:solidFill>
                   <a:srgbClr val="000066"/>
                 </a:solidFill>
@@ -3156,7 +3156,7 @@
               <a:buNone/>
             </a:pPr>
             <a:r>
-              <a:rPr lang="zh-TW" altLang="en-US" sz="5400" b="1" dirty="0">
+              <a:rPr lang="zh-TW" altLang="en-US" sz="4400" b="1" dirty="0">
                 <a:solidFill>
                   <a:srgbClr val="000066"/>
                 </a:solidFill>
@@ -3171,7 +3171,7 @@
               <a:buNone/>
             </a:pPr>
             <a:r>
-              <a:rPr lang="zh-TW" altLang="en-US" sz="5400" b="1" dirty="0">
+              <a:rPr lang="zh-TW" altLang="en-US" sz="4400" b="1" dirty="0">
                 <a:solidFill>
                   <a:srgbClr val="000066"/>
                 </a:solidFill>
@@ -3186,7 +3186,7 @@
               <a:buNone/>
             </a:pPr>
             <a:r>
-              <a:rPr lang="zh-TW" altLang="en-US" sz="5400" b="1" dirty="0">
+              <a:rPr lang="zh-TW" altLang="en-US" sz="4400" b="1" dirty="0">
                 <a:solidFill>
                   <a:srgbClr val="000066"/>
                 </a:solidFill>
@@ -3196,7 +3196,7 @@
               <a:t>把它化為讚美之</a:t>
             </a:r>
             <a:r>
-              <a:rPr lang="zh-TW" altLang="en-US" sz="5400" b="1" dirty="0" smtClean="0">
+              <a:rPr lang="zh-TW" altLang="en-US" sz="4400" b="1" dirty="0" smtClean="0">
                 <a:solidFill>
                   <a:srgbClr val="000066"/>
                 </a:solidFill>
@@ -3205,7 +3205,7 @@
               </a:rPr>
               <a:t>泉</a:t>
             </a:r>
-            <a:endParaRPr lang="zh-TW" altLang="en-US" sz="5400" b="1" dirty="0">
+            <a:endParaRPr lang="zh-TW" altLang="en-US" sz="4400" b="1" dirty="0">
               <a:solidFill>
                 <a:srgbClr val="000066"/>
               </a:solidFill>
@@ -3258,7 +3258,7 @@
           <a:lstStyle/>
           <a:p>
             <a:r>
-              <a:rPr lang="zh-TW" altLang="en-US" b="1" dirty="0">
+              <a:rPr lang="zh-TW" altLang="en-US" sz="4000" b="1" dirty="0">
                 <a:solidFill>
                   <a:srgbClr val="000066"/>
                 </a:solidFill>
@@ -3268,7 +3268,7 @@
               <a:t>讚美之</a:t>
             </a:r>
             <a:r>
-              <a:rPr lang="zh-TW" altLang="en-US" b="1" dirty="0" smtClean="0">
+              <a:rPr lang="zh-TW" altLang="en-US" sz="4000" b="1" dirty="0">
                 <a:solidFill>
                   <a:srgbClr val="000066"/>
                 </a:solidFill>
@@ -3277,7 +3277,7 @@
               </a:rPr>
               <a:t>泉</a:t>
             </a:r>
-            <a:endParaRPr lang="zh-TW" altLang="en-US" b="1" dirty="0">
+            <a:endParaRPr lang="zh-TW" altLang="en-US" sz="4000" b="1" dirty="0">
               <a:solidFill>
                 <a:srgbClr val="000066"/>
               </a:solidFill>
@@ -3308,7 +3308,7 @@
               <a:buNone/>
             </a:pPr>
             <a:r>
-              <a:rPr lang="zh-TW" altLang="en-US" sz="5400" b="1" dirty="0">
+              <a:rPr lang="zh-TW" altLang="en-US" sz="4400" b="1" dirty="0">
                 <a:solidFill>
                   <a:srgbClr val="000066"/>
                 </a:solidFill>
@@ -3323,7 +3323,7 @@
               <a:buNone/>
             </a:pPr>
             <a:r>
-              <a:rPr lang="zh-TW" altLang="en-US" sz="5400" b="1" dirty="0">
+              <a:rPr lang="zh-TW" altLang="en-US" sz="4400" b="1" dirty="0">
                 <a:solidFill>
                   <a:srgbClr val="000066"/>
                 </a:solidFill>
@@ -3338,7 +3338,7 @@
               <a:buNone/>
             </a:pPr>
             <a:r>
-              <a:rPr lang="zh-TW" altLang="en-US" sz="5400" b="1" dirty="0">
+              <a:rPr lang="zh-TW" altLang="en-US" sz="4400" b="1" dirty="0">
                 <a:solidFill>
                   <a:srgbClr val="000066"/>
                 </a:solidFill>
@@ -3353,7 +3353,7 @@
               <a:buNone/>
             </a:pPr>
             <a:r>
-              <a:rPr lang="zh-TW" altLang="en-US" sz="5400" b="1" dirty="0">
+              <a:rPr lang="zh-TW" altLang="en-US" sz="4400" b="1" dirty="0">
                 <a:solidFill>
                   <a:srgbClr val="000066"/>
                 </a:solidFill>
@@ -3398,8 +3398,8 @@
         </p:nvSpPr>
         <p:spPr>
           <a:xfrm>
-            <a:off x="457200" y="274680"/>
-            <a:ext cx="8229240" cy="1142640"/>
+            <a:off x="457200" y="206010"/>
+            <a:ext cx="8229240" cy="856980"/>
           </a:xfrm>
           <a:prstGeom prst="rect">
             <a:avLst/>
@@ -3421,7 +3421,7 @@
               </a:lnSpc>
             </a:pPr>
             <a:r>
-              <a:rPr lang="zh-TW" sz="4400" b="1" strike="noStrike" spc="-1">
+              <a:rPr lang="zh-TW" sz="4000" b="1" strike="noStrike" spc="-1" dirty="0">
                 <a:solidFill>
                   <a:srgbClr val="660033"/>
                 </a:solidFill>
@@ -3430,7 +3430,7 @@
               </a:rPr>
               <a:t>你們要讚美耶和華</a:t>
             </a:r>
-            <a:endParaRPr lang="zh-TW" sz="4400" b="0" strike="noStrike" spc="-1">
+            <a:endParaRPr lang="zh-TW" sz="4000" b="0" strike="noStrike" spc="-1" dirty="0">
               <a:solidFill>
                 <a:srgbClr val="000000"/>
               </a:solidFill>
@@ -3447,8 +3447,8 @@
         </p:nvSpPr>
         <p:spPr>
           <a:xfrm>
-            <a:off x="457200" y="1600200"/>
-            <a:ext cx="8229240" cy="4525560"/>
+            <a:off x="457200" y="1200150"/>
+            <a:ext cx="8229240" cy="3394170"/>
           </a:xfrm>
           <a:prstGeom prst="rect">
             <a:avLst/>
@@ -3473,7 +3473,7 @@
               </a:spcBef>
             </a:pPr>
             <a:r>
-              <a:rPr lang="zh-TW" sz="5400" b="1" strike="noStrike" spc="-1" dirty="0">
+              <a:rPr lang="zh-TW" sz="4400" b="1" strike="noStrike" spc="-1" dirty="0">
                 <a:solidFill>
                   <a:srgbClr val="660033"/>
                 </a:solidFill>
@@ -3482,7 +3482,7 @@
               </a:rPr>
               <a:t>你們要讚美耶和華</a:t>
             </a:r>
-            <a:endParaRPr lang="zh-TW" sz="5400" b="0" strike="noStrike" spc="-1" dirty="0">
+            <a:endParaRPr lang="zh-TW" sz="4400" b="0" strike="noStrike" spc="-1" dirty="0">
               <a:solidFill>
                 <a:srgbClr val="000000"/>
               </a:solidFill>
@@ -3499,7 +3499,7 @@
               </a:spcBef>
             </a:pPr>
             <a:r>
-              <a:rPr lang="zh-TW" sz="5400" b="1" strike="noStrike" spc="-1" dirty="0">
+              <a:rPr lang="zh-TW" sz="4400" b="1" strike="noStrike" spc="-1" dirty="0">
                 <a:solidFill>
                   <a:srgbClr val="660033"/>
                 </a:solidFill>
@@ -3508,7 +3508,7 @@
               </a:rPr>
               <a:t>在祂的聖所讚美祂</a:t>
             </a:r>
-            <a:endParaRPr lang="zh-TW" sz="5400" b="0" strike="noStrike" spc="-1" dirty="0">
+            <a:endParaRPr lang="zh-TW" sz="4400" b="0" strike="noStrike" spc="-1" dirty="0">
               <a:solidFill>
                 <a:srgbClr val="000000"/>
               </a:solidFill>
@@ -3525,7 +3525,7 @@
               </a:spcBef>
             </a:pPr>
             <a:r>
-              <a:rPr lang="zh-TW" sz="5400" b="1" strike="noStrike" spc="-1" dirty="0">
+              <a:rPr lang="zh-TW" sz="4400" b="1" strike="noStrike" spc="-1" dirty="0">
                 <a:solidFill>
                   <a:srgbClr val="660033"/>
                 </a:solidFill>
@@ -3534,7 +3534,7 @@
               </a:rPr>
               <a:t>你們要讚美耶和華</a:t>
             </a:r>
-            <a:endParaRPr lang="zh-TW" sz="5400" b="0" strike="noStrike" spc="-1" dirty="0">
+            <a:endParaRPr lang="zh-TW" sz="4400" b="0" strike="noStrike" spc="-1" dirty="0">
               <a:solidFill>
                 <a:srgbClr val="000000"/>
               </a:solidFill>
@@ -3551,7 +3551,7 @@
               </a:spcBef>
             </a:pPr>
             <a:r>
-              <a:rPr lang="zh-TW" sz="5400" b="1" strike="noStrike" spc="-1" dirty="0">
+              <a:rPr lang="zh-TW" sz="4400" b="1" strike="noStrike" spc="-1" dirty="0">
                 <a:solidFill>
                   <a:srgbClr val="660033"/>
                 </a:solidFill>
@@ -3560,7 +3560,7 @@
               </a:rPr>
               <a:t>在祂的穹蒼讚美祂</a:t>
             </a:r>
-            <a:endParaRPr lang="zh-TW" sz="5400" b="0" strike="noStrike" spc="-1" dirty="0">
+            <a:endParaRPr lang="zh-TW" sz="4400" b="0" strike="noStrike" spc="-1" dirty="0">
               <a:solidFill>
                 <a:srgbClr val="000000"/>
               </a:solidFill>
@@ -3629,8 +3629,8 @@
         </p:nvSpPr>
         <p:spPr>
           <a:xfrm>
-            <a:off x="457200" y="274680"/>
-            <a:ext cx="8229240" cy="1142640"/>
+            <a:off x="457200" y="206010"/>
+            <a:ext cx="8229240" cy="856980"/>
           </a:xfrm>
           <a:prstGeom prst="rect">
             <a:avLst/>
@@ -3652,7 +3652,7 @@
               </a:lnSpc>
             </a:pPr>
             <a:r>
-              <a:rPr lang="zh-TW" sz="4400" b="1" strike="noStrike" spc="-1">
+              <a:rPr lang="zh-TW" sz="4000" b="1" spc="-1" dirty="0">
                 <a:solidFill>
                   <a:srgbClr val="660033"/>
                 </a:solidFill>
@@ -3661,12 +3661,6 @@
               </a:rPr>
               <a:t>你們要讚美耶和華</a:t>
             </a:r>
-            <a:endParaRPr lang="zh-TW" sz="4400" b="0" strike="noStrike" spc="-1">
-              <a:solidFill>
-                <a:srgbClr val="000000"/>
-              </a:solidFill>
-              <a:latin typeface="Calibri"/>
-            </a:endParaRPr>
           </a:p>
         </p:txBody>
       </p:sp>
@@ -3678,8 +3672,8 @@
         </p:nvSpPr>
         <p:spPr>
           <a:xfrm>
-            <a:off x="457200" y="1600200"/>
-            <a:ext cx="8229240" cy="4525560"/>
+            <a:off x="457200" y="1200150"/>
+            <a:ext cx="8229240" cy="3394170"/>
           </a:xfrm>
           <a:prstGeom prst="rect">
             <a:avLst/>
@@ -3704,7 +3698,7 @@
               </a:spcBef>
             </a:pPr>
             <a:r>
-              <a:rPr lang="zh-TW" sz="5400" b="1" strike="noStrike" spc="-1">
+              <a:rPr lang="zh-TW" sz="4400" b="1" spc="-1" dirty="0">
                 <a:solidFill>
                   <a:srgbClr val="660033"/>
                 </a:solidFill>
@@ -3713,12 +3707,6 @@
               </a:rPr>
               <a:t>要因著祂的大能讚美祂</a:t>
             </a:r>
-            <a:endParaRPr lang="zh-TW" sz="5400" b="0" strike="noStrike" spc="-1">
-              <a:solidFill>
-                <a:srgbClr val="000000"/>
-              </a:solidFill>
-              <a:latin typeface="Calibri"/>
-            </a:endParaRPr>
           </a:p>
           <a:p>
             <a:pPr marL="343080" indent="-342720" algn="ctr">
@@ -3730,7 +3718,7 @@
               </a:spcBef>
             </a:pPr>
             <a:r>
-              <a:rPr lang="zh-TW" sz="5400" b="1" strike="noStrike" spc="-1">
+              <a:rPr lang="zh-TW" sz="4400" b="1" spc="-1" dirty="0">
                 <a:solidFill>
                   <a:srgbClr val="660033"/>
                 </a:solidFill>
@@ -3739,12 +3727,6 @@
               </a:rPr>
               <a:t>要因著祂的榮耀讚美祂</a:t>
             </a:r>
-            <a:endParaRPr lang="zh-TW" sz="5400" b="0" strike="noStrike" spc="-1">
-              <a:solidFill>
-                <a:srgbClr val="000000"/>
-              </a:solidFill>
-              <a:latin typeface="Calibri"/>
-            </a:endParaRPr>
           </a:p>
           <a:p>
             <a:pPr marL="343080" indent="-342720" algn="ctr">
@@ -3756,7 +3738,7 @@
               </a:spcBef>
             </a:pPr>
             <a:r>
-              <a:rPr lang="zh-TW" sz="5400" b="1" strike="noStrike" spc="-1">
+              <a:rPr lang="zh-TW" sz="4400" b="1" spc="-1" dirty="0">
                 <a:solidFill>
                   <a:srgbClr val="660033"/>
                 </a:solidFill>
@@ -3765,12 +3747,6 @@
               </a:rPr>
               <a:t>要因著祂的慈愛讚美祂</a:t>
             </a:r>
-            <a:endParaRPr lang="zh-TW" sz="5400" b="0" strike="noStrike" spc="-1">
-              <a:solidFill>
-                <a:srgbClr val="000000"/>
-              </a:solidFill>
-              <a:latin typeface="Calibri"/>
-            </a:endParaRPr>
           </a:p>
           <a:p>
             <a:pPr marL="343080" indent="-342720" algn="ctr">
@@ -3782,7 +3758,7 @@
               </a:spcBef>
             </a:pPr>
             <a:r>
-              <a:rPr lang="zh-TW" sz="5400" b="1" strike="noStrike" spc="-1">
+              <a:rPr lang="zh-TW" sz="4400" b="1" spc="-1" dirty="0">
                 <a:solidFill>
                   <a:srgbClr val="660033"/>
                 </a:solidFill>
@@ -3791,12 +3767,6 @@
               </a:rPr>
               <a:t>凡有氣息的都要讚美祂</a:t>
             </a:r>
-            <a:endParaRPr lang="zh-TW" sz="5400" b="0" strike="noStrike" spc="-1">
-              <a:solidFill>
-                <a:srgbClr val="000000"/>
-              </a:solidFill>
-              <a:latin typeface="Calibri"/>
-            </a:endParaRPr>
           </a:p>
         </p:txBody>
       </p:sp>
@@ -3860,8 +3830,8 @@
         </p:nvSpPr>
         <p:spPr>
           <a:xfrm>
-            <a:off x="457200" y="274680"/>
-            <a:ext cx="8229240" cy="1142640"/>
+            <a:off x="457200" y="206010"/>
+            <a:ext cx="8229240" cy="856980"/>
           </a:xfrm>
           <a:prstGeom prst="rect">
             <a:avLst/>
@@ -3877,13 +3847,9 @@
           </a:bodyPr>
           <a:lstStyle/>
           <a:p>
-            <a:pPr algn="ctr">
-              <a:lnSpc>
-                <a:spcPct val="100000"/>
-              </a:lnSpc>
-            </a:pPr>
-            <a:r>
-              <a:rPr lang="zh-TW" sz="4400" b="1" strike="noStrike" spc="-1">
+            <a:pPr algn="ctr"/>
+            <a:r>
+              <a:rPr lang="zh-TW" sz="4000" b="1" spc="-1" dirty="0">
                 <a:solidFill>
                   <a:srgbClr val="660033"/>
                 </a:solidFill>
@@ -3892,12 +3858,6 @@
               </a:rPr>
               <a:t>你們要讚美耶和華</a:t>
             </a:r>
-            <a:endParaRPr lang="zh-TW" sz="4400" b="0" strike="noStrike" spc="-1">
-              <a:solidFill>
-                <a:srgbClr val="000000"/>
-              </a:solidFill>
-              <a:latin typeface="Calibri"/>
-            </a:endParaRPr>
           </a:p>
         </p:txBody>
       </p:sp>
@@ -3909,8 +3869,8 @@
         </p:nvSpPr>
         <p:spPr>
           <a:xfrm>
-            <a:off x="457200" y="1600200"/>
-            <a:ext cx="8229240" cy="4525560"/>
+            <a:off x="457200" y="1200150"/>
+            <a:ext cx="8229240" cy="3394170"/>
           </a:xfrm>
           <a:prstGeom prst="rect">
             <a:avLst/>
@@ -3922,20 +3882,20 @@
         </p:spPr>
         <p:txBody>
           <a:bodyPr>
-            <a:normAutofit/>
+            <a:noAutofit/>
           </a:bodyPr>
           <a:lstStyle/>
           <a:p>
             <a:pPr marL="343080" indent="-342720" algn="ctr">
               <a:lnSpc>
-                <a:spcPct val="100000"/>
+                <a:spcPct val="110000"/>
               </a:lnSpc>
               <a:spcBef>
                 <a:spcPts val="1080"/>
               </a:spcBef>
             </a:pPr>
             <a:r>
-              <a:rPr lang="zh-TW" sz="5400" b="1" strike="noStrike" spc="-1" dirty="0">
+              <a:rPr lang="zh-TW" sz="4400" b="1" spc="-1" dirty="0">
                 <a:solidFill>
                   <a:srgbClr val="660033"/>
                 </a:solidFill>
@@ -3944,24 +3904,18 @@
               </a:rPr>
               <a:t>我們要讚美耶和華</a:t>
             </a:r>
-            <a:endParaRPr lang="zh-TW" sz="5400" b="0" strike="noStrike" spc="-1" dirty="0">
-              <a:solidFill>
-                <a:srgbClr val="000000"/>
-              </a:solidFill>
-              <a:latin typeface="Calibri"/>
-            </a:endParaRPr>
           </a:p>
           <a:p>
             <a:pPr marL="343080" indent="-342720" algn="ctr">
               <a:lnSpc>
-                <a:spcPct val="100000"/>
+                <a:spcPct val="110000"/>
               </a:lnSpc>
               <a:spcBef>
                 <a:spcPts val="1080"/>
               </a:spcBef>
             </a:pPr>
             <a:r>
-              <a:rPr lang="zh-TW" sz="5400" b="1" strike="noStrike" spc="-1" dirty="0">
+              <a:rPr lang="zh-TW" sz="4400" b="1" spc="-1" dirty="0">
                 <a:solidFill>
                   <a:srgbClr val="660033"/>
                 </a:solidFill>
@@ -3970,24 +3924,18 @@
               </a:rPr>
               <a:t>來敞開胸懷讚美祂</a:t>
             </a:r>
-            <a:endParaRPr lang="zh-TW" sz="5400" b="0" strike="noStrike" spc="-1" dirty="0">
-              <a:solidFill>
-                <a:srgbClr val="000000"/>
-              </a:solidFill>
-              <a:latin typeface="Calibri"/>
-            </a:endParaRPr>
           </a:p>
           <a:p>
             <a:pPr marL="343080" indent="-342720" algn="ctr">
               <a:lnSpc>
-                <a:spcPct val="100000"/>
+                <a:spcPct val="110000"/>
               </a:lnSpc>
               <a:spcBef>
                 <a:spcPts val="1080"/>
               </a:spcBef>
             </a:pPr>
             <a:r>
-              <a:rPr lang="zh-TW" sz="5400" b="1" strike="noStrike" spc="-1" dirty="0">
+              <a:rPr lang="zh-TW" sz="4400" b="1" spc="-1" dirty="0">
                 <a:solidFill>
                   <a:srgbClr val="660033"/>
                 </a:solidFill>
@@ -3996,24 +3944,18 @@
               </a:rPr>
               <a:t>我們要讚美耶和華</a:t>
             </a:r>
-            <a:endParaRPr lang="zh-TW" sz="5400" b="0" strike="noStrike" spc="-1" dirty="0">
-              <a:solidFill>
-                <a:srgbClr val="000000"/>
-              </a:solidFill>
-              <a:latin typeface="Calibri"/>
-            </a:endParaRPr>
           </a:p>
           <a:p>
             <a:pPr marL="343080" indent="-342720" algn="ctr">
               <a:lnSpc>
-                <a:spcPct val="100000"/>
+                <a:spcPct val="110000"/>
               </a:lnSpc>
               <a:spcBef>
                 <a:spcPts val="1080"/>
               </a:spcBef>
             </a:pPr>
             <a:r>
-              <a:rPr lang="zh-TW" sz="5400" b="1" strike="noStrike" spc="-1" dirty="0">
+              <a:rPr lang="zh-TW" sz="4400" b="1" spc="-1" dirty="0">
                 <a:solidFill>
                   <a:srgbClr val="660033"/>
                 </a:solidFill>
@@ -4022,12 +3964,6 @@
               </a:rPr>
               <a:t>來高聲歡呼讚美祂</a:t>
             </a:r>
-            <a:endParaRPr lang="zh-TW" sz="5400" b="0" strike="noStrike" spc="-1" dirty="0">
-              <a:solidFill>
-                <a:srgbClr val="000000"/>
-              </a:solidFill>
-              <a:latin typeface="Calibri"/>
-            </a:endParaRPr>
           </a:p>
         </p:txBody>
       </p:sp>
@@ -4091,8 +4027,8 @@
         </p:nvSpPr>
         <p:spPr>
           <a:xfrm>
-            <a:off x="457200" y="274680"/>
-            <a:ext cx="8229240" cy="1142640"/>
+            <a:off x="457200" y="206010"/>
+            <a:ext cx="8229240" cy="856980"/>
           </a:xfrm>
           <a:prstGeom prst="rect">
             <a:avLst/>
@@ -4114,7 +4050,7 @@
               </a:lnSpc>
             </a:pPr>
             <a:r>
-              <a:rPr lang="zh-TW" sz="4400" b="1" strike="noStrike" spc="-1">
+              <a:rPr lang="zh-TW" sz="4000" b="1" spc="-1" dirty="0">
                 <a:solidFill>
                   <a:srgbClr val="660033"/>
                 </a:solidFill>
@@ -4123,12 +4059,6 @@
               </a:rPr>
               <a:t>你們要讚美耶和華</a:t>
             </a:r>
-            <a:endParaRPr lang="zh-TW" sz="4400" b="0" strike="noStrike" spc="-1">
-              <a:solidFill>
-                <a:srgbClr val="000000"/>
-              </a:solidFill>
-              <a:latin typeface="Calibri"/>
-            </a:endParaRPr>
           </a:p>
         </p:txBody>
       </p:sp>
@@ -4140,8 +4070,8 @@
         </p:nvSpPr>
         <p:spPr>
           <a:xfrm>
-            <a:off x="457200" y="1600200"/>
-            <a:ext cx="8229240" cy="4525560"/>
+            <a:off x="457200" y="1200150"/>
+            <a:ext cx="8229240" cy="3394170"/>
           </a:xfrm>
           <a:prstGeom prst="rect">
             <a:avLst/>
@@ -4153,20 +4083,20 @@
         </p:spPr>
         <p:txBody>
           <a:bodyPr>
-            <a:normAutofit/>
+            <a:noAutofit/>
           </a:bodyPr>
           <a:lstStyle/>
           <a:p>
             <a:pPr marL="343080" indent="-342720" algn="ctr">
               <a:lnSpc>
-                <a:spcPct val="100000"/>
+                <a:spcPct val="120000"/>
               </a:lnSpc>
               <a:spcBef>
                 <a:spcPts val="1080"/>
               </a:spcBef>
             </a:pPr>
             <a:r>
-              <a:rPr lang="zh-TW" sz="5400" b="1" strike="noStrike" spc="-1" dirty="0">
+              <a:rPr lang="zh-TW" sz="4400" b="1" spc="-1" dirty="0">
                 <a:solidFill>
                   <a:srgbClr val="660033"/>
                 </a:solidFill>
@@ -4175,24 +4105,18 @@
               </a:rPr>
               <a:t>我們用鼓瑟彈琴讚美祂</a:t>
             </a:r>
-            <a:endParaRPr lang="zh-TW" sz="5400" b="0" strike="noStrike" spc="-1" dirty="0">
-              <a:solidFill>
-                <a:srgbClr val="000000"/>
-              </a:solidFill>
-              <a:latin typeface="Calibri"/>
-            </a:endParaRPr>
           </a:p>
           <a:p>
             <a:pPr marL="343080" indent="-342720" algn="ctr">
               <a:lnSpc>
-                <a:spcPct val="100000"/>
+                <a:spcPct val="120000"/>
               </a:lnSpc>
               <a:spcBef>
                 <a:spcPts val="1080"/>
               </a:spcBef>
             </a:pPr>
             <a:r>
-              <a:rPr lang="zh-TW" sz="5400" b="1" strike="noStrike" spc="-1" dirty="0">
+              <a:rPr lang="zh-TW" sz="4400" b="1" spc="-1" dirty="0">
                 <a:solidFill>
                   <a:srgbClr val="660033"/>
                 </a:solidFill>
@@ -4201,24 +4125,18 @@
               </a:rPr>
               <a:t>我們來擊鼓跳舞讚美祂</a:t>
             </a:r>
-            <a:endParaRPr lang="zh-TW" sz="5400" b="0" strike="noStrike" spc="-1" dirty="0">
-              <a:solidFill>
-                <a:srgbClr val="000000"/>
-              </a:solidFill>
-              <a:latin typeface="Calibri"/>
-            </a:endParaRPr>
           </a:p>
           <a:p>
             <a:pPr marL="343080" indent="-342720" algn="ctr">
               <a:lnSpc>
-                <a:spcPct val="100000"/>
+                <a:spcPct val="120000"/>
               </a:lnSpc>
               <a:spcBef>
                 <a:spcPts val="1080"/>
               </a:spcBef>
             </a:pPr>
             <a:r>
-              <a:rPr lang="zh-TW" sz="5400" b="1" strike="noStrike" spc="-1" dirty="0">
+              <a:rPr lang="zh-TW" sz="4400" b="1" spc="-1" dirty="0">
                 <a:solidFill>
                   <a:srgbClr val="660033"/>
                 </a:solidFill>
@@ -4228,7 +4146,7 @@
               <a:t>我們</a:t>
             </a:r>
             <a:r>
-              <a:rPr lang="zh-TW" sz="5400" b="1" strike="noStrike" spc="-1" dirty="0" smtClean="0">
+              <a:rPr lang="zh-TW" sz="4400" b="1" spc="-1" dirty="0">
                 <a:solidFill>
                   <a:srgbClr val="660033"/>
                 </a:solidFill>
@@ -4238,7 +4156,7 @@
               <a:t>用絲弦樂器</a:t>
             </a:r>
             <a:r>
-              <a:rPr lang="zh-TW" sz="5400" b="1" strike="noStrike" spc="-1" dirty="0">
+              <a:rPr lang="zh-TW" sz="4400" b="1" spc="-1" dirty="0">
                 <a:solidFill>
                   <a:srgbClr val="660033"/>
                 </a:solidFill>
@@ -4247,24 +4165,18 @@
               </a:rPr>
               <a:t>讚美祂</a:t>
             </a:r>
-            <a:endParaRPr lang="zh-TW" sz="5400" b="0" strike="noStrike" spc="-1" dirty="0">
-              <a:solidFill>
-                <a:srgbClr val="000000"/>
-              </a:solidFill>
-              <a:latin typeface="Calibri"/>
-            </a:endParaRPr>
           </a:p>
           <a:p>
             <a:pPr marL="343080" indent="-342720" algn="ctr">
               <a:lnSpc>
-                <a:spcPct val="100000"/>
+                <a:spcPct val="120000"/>
               </a:lnSpc>
               <a:spcBef>
                 <a:spcPts val="1080"/>
               </a:spcBef>
             </a:pPr>
             <a:r>
-              <a:rPr lang="zh-TW" sz="5400" b="1" strike="noStrike" spc="-1" dirty="0">
+              <a:rPr lang="zh-TW" sz="4400" b="1" spc="-1" dirty="0">
                 <a:solidFill>
                   <a:srgbClr val="660033"/>
                 </a:solidFill>
@@ -4274,7 +4186,7 @@
               <a:t>凡有</a:t>
             </a:r>
             <a:r>
-              <a:rPr lang="zh-TW" sz="5400" b="1" strike="noStrike" spc="-1" dirty="0" smtClean="0">
+              <a:rPr lang="zh-TW" sz="4400" b="1" spc="-1" dirty="0">
                 <a:solidFill>
                   <a:srgbClr val="660033"/>
                 </a:solidFill>
@@ -4284,7 +4196,7 @@
               <a:t>氣息的</a:t>
             </a:r>
             <a:r>
-              <a:rPr lang="zh-TW" sz="5400" b="1" strike="noStrike" spc="-1" dirty="0">
+              <a:rPr lang="zh-TW" sz="4400" b="1" spc="-1" dirty="0">
                 <a:solidFill>
                   <a:srgbClr val="660033"/>
                 </a:solidFill>
@@ -4293,12 +4205,6 @@
               </a:rPr>
               <a:t>都要讚美祂</a:t>
             </a:r>
-            <a:endParaRPr lang="zh-TW" sz="5400" b="0" strike="noStrike" spc="-1" dirty="0">
-              <a:solidFill>
-                <a:srgbClr val="000000"/>
-              </a:solidFill>
-              <a:latin typeface="Calibri"/>
-            </a:endParaRPr>
           </a:p>
         </p:txBody>
       </p:sp>

</xml_diff>